<commit_message>
PPTX con assignment 3
</commit_message>
<xml_diff>
--- a/Presentacion.pptx
+++ b/Presentacion.pptx
@@ -5,16 +5,17 @@
     <p:sldMasterId id="2147483648" r:id="rId1"/>
   </p:sldMasterIdLst>
   <p:notesMasterIdLst>
-    <p:notesMasterId r:id="rId4"/>
+    <p:notesMasterId r:id="rId10"/>
   </p:notesMasterIdLst>
   <p:sldIdLst>
-    <p:sldId id="256" r:id="rId3"/>
-    <p:sldId id="257" r:id="rId5"/>
-    <p:sldId id="258" r:id="rId6"/>
-    <p:sldId id="259" r:id="rId7"/>
-    <p:sldId id="260" r:id="rId8"/>
-    <p:sldId id="261" r:id="rId9"/>
-    <p:sldId id="262" r:id="rId10"/>
+    <p:sldId id="256" r:id="rId2"/>
+    <p:sldId id="257" r:id="rId3"/>
+    <p:sldId id="258" r:id="rId4"/>
+    <p:sldId id="259" r:id="rId5"/>
+    <p:sldId id="263" r:id="rId6"/>
+    <p:sldId id="260" r:id="rId7"/>
+    <p:sldId id="261" r:id="rId8"/>
+    <p:sldId id="262" r:id="rId9"/>
   </p:sldIdLst>
   <p:sldSz cx="12192000" cy="6858000"/>
   <p:notesSz cx="6858000" cy="9144000"/>
@@ -113,6 +114,11 @@
       </a:defRPr>
     </a:lvl9pPr>
   </p:defaultTextStyle>
+  <p:extLst>
+    <p:ext uri="{EFAFB233-063F-42B5-8137-9DF3F51BA10A}">
+      <p15:sldGuideLst xmlns:p15="http://schemas.microsoft.com/office/powerpoint/2012/main"/>
+    </p:ext>
+  </p:extLst>
 </p:presentation>
 </file>
 
@@ -198,6 +204,7 @@
           <a:p>
             <a:fld id="{3EFD42F7-718C-4B98-AAEC-167E6DDD60A7}" type="datetimeFigureOut">
               <a:rPr lang="en-US" smtClean="0"/>
+              <a:t>12/11/2018</a:t>
             </a:fld>
             <a:endParaRPr lang="en-US"/>
           </a:p>
@@ -264,7 +271,6 @@
               <a:rPr lang="en-US" smtClean="0"/>
               <a:t>Click to edit Master text styles</a:t>
             </a:r>
-            <a:endParaRPr lang="en-US" smtClean="0"/>
           </a:p>
           <a:p>
             <a:pPr lvl="1"/>
@@ -272,7 +278,6 @@
               <a:rPr lang="en-US" smtClean="0"/>
               <a:t>Second level</a:t>
             </a:r>
-            <a:endParaRPr lang="en-US" smtClean="0"/>
           </a:p>
           <a:p>
             <a:pPr lvl="2"/>
@@ -280,7 +285,6 @@
               <a:rPr lang="en-US" smtClean="0"/>
               <a:t>Third level</a:t>
             </a:r>
-            <a:endParaRPr lang="en-US" smtClean="0"/>
           </a:p>
           <a:p>
             <a:pPr lvl="3"/>
@@ -288,7 +292,6 @@
               <a:rPr lang="en-US" smtClean="0"/>
               <a:t>Fourth level</a:t>
             </a:r>
-            <a:endParaRPr lang="en-US" smtClean="0"/>
           </a:p>
           <a:p>
             <a:pPr lvl="4"/>
@@ -360,12 +363,18 @@
           <a:p>
             <a:fld id="{21B2AA4F-B828-4D7C-AFD3-893933DAFCB4}" type="slidenum">
               <a:rPr lang="en-US" smtClean="0"/>
+              <a:t>‹Nº›</a:t>
             </a:fld>
             <a:endParaRPr lang="en-US"/>
           </a:p>
         </p:txBody>
       </p:sp>
     </p:spTree>
+    <p:extLst>
+      <p:ext uri="{BB962C8B-B14F-4D97-AF65-F5344CB8AC3E}">
+        <p14:creationId xmlns:p14="http://schemas.microsoft.com/office/powerpoint/2010/main" val="4009764286"/>
+      </p:ext>
+    </p:extLst>
   </p:cSld>
   <p:clrMap bg1="lt1" tx1="dk1" bg2="lt2" tx2="dk2" accent1="accent1" accent2="accent2" accent3="accent3" accent4="accent4" accent5="accent5" accent6="accent6" hlink="hlink" folHlink="folHlink"/>
   <p:notesStyle>
@@ -472,11 +481,20 @@
         <p:cNvGrpSpPr/>
         <p:nvPr/>
       </p:nvGrpSpPr>
-      <p:grpSpPr/>
+      <p:grpSpPr>
+        <a:xfrm>
+          <a:off x="0" y="0"/>
+          <a:ext cx="0" cy="0"/>
+          <a:chOff x="0" y="0"/>
+          <a:chExt cx="0" cy="0"/>
+        </a:xfrm>
+      </p:grpSpPr>
       <p:sp>
         <p:nvSpPr>
           <p:cNvPr id="2" name="Slide Image Placeholder 1"/>
-          <p:cNvSpPr/>
+          <p:cNvSpPr>
+            <a:spLocks noGrp="1" noRot="1" noChangeAspect="1"/>
+          </p:cNvSpPr>
           <p:nvPr>
             <p:ph type="sldImg" idx="2"/>
           </p:nvPr>
@@ -486,7 +504,9 @@
       <p:sp>
         <p:nvSpPr>
           <p:cNvPr id="3" name="Text Placeholder 2"/>
-          <p:cNvSpPr/>
+          <p:cNvSpPr>
+            <a:spLocks noGrp="1"/>
+          </p:cNvSpPr>
           <p:nvPr>
             <p:ph type="body" idx="3"/>
           </p:nvPr>
@@ -494,12 +514,18 @@
         <p:spPr/>
         <p:txBody>
           <a:bodyPr/>
+          <a:lstStyle/>
           <a:p>
             <a:endParaRPr lang="en-US"/>
           </a:p>
         </p:txBody>
       </p:sp>
     </p:spTree>
+    <p:extLst>
+      <p:ext uri="{BB962C8B-B14F-4D97-AF65-F5344CB8AC3E}">
+        <p14:creationId xmlns:p14="http://schemas.microsoft.com/office/powerpoint/2010/main" val="3817410458"/>
+      </p:ext>
+    </p:extLst>
   </p:cSld>
   <p:clrMapOvr>
     <a:masterClrMapping/>
@@ -638,6 +664,7 @@
           <a:p>
             <a:fld id="{63A1C593-65D0-4073-BCC9-577B9352EA97}" type="datetimeFigureOut">
               <a:rPr lang="en-US" smtClean="0"/>
+              <a:t>12/11/2018</a:t>
             </a:fld>
             <a:endParaRPr lang="en-US"/>
           </a:p>
@@ -679,6 +706,7 @@
           <a:p>
             <a:fld id="{9B618960-8005-486C-9A75-10CB2AAC16F9}" type="slidenum">
               <a:rPr lang="en-US" smtClean="0"/>
+              <a:t>‹Nº›</a:t>
             </a:fld>
             <a:endParaRPr lang="en-US"/>
           </a:p>
@@ -753,7 +781,6 @@
               <a:rPr lang="en-US" smtClean="0"/>
               <a:t>Click to edit Master text styles</a:t>
             </a:r>
-            <a:endParaRPr lang="en-US" smtClean="0"/>
           </a:p>
           <a:p>
             <a:pPr lvl="1"/>
@@ -761,7 +788,6 @@
               <a:rPr lang="en-US" smtClean="0"/>
               <a:t>Second level</a:t>
             </a:r>
-            <a:endParaRPr lang="en-US" smtClean="0"/>
           </a:p>
           <a:p>
             <a:pPr lvl="2"/>
@@ -769,7 +795,6 @@
               <a:rPr lang="en-US" smtClean="0"/>
               <a:t>Third level</a:t>
             </a:r>
-            <a:endParaRPr lang="en-US" smtClean="0"/>
           </a:p>
           <a:p>
             <a:pPr lvl="3"/>
@@ -777,7 +802,6 @@
               <a:rPr lang="en-US" smtClean="0"/>
               <a:t>Fourth level</a:t>
             </a:r>
-            <a:endParaRPr lang="en-US" smtClean="0"/>
           </a:p>
           <a:p>
             <a:pPr lvl="4"/>
@@ -806,6 +830,7 @@
           <a:p>
             <a:fld id="{63A1C593-65D0-4073-BCC9-577B9352EA97}" type="datetimeFigureOut">
               <a:rPr lang="en-US" smtClean="0"/>
+              <a:t>12/11/2018</a:t>
             </a:fld>
             <a:endParaRPr lang="en-US"/>
           </a:p>
@@ -847,6 +872,7 @@
           <a:p>
             <a:fld id="{9B618960-8005-486C-9A75-10CB2AAC16F9}" type="slidenum">
               <a:rPr lang="en-US" smtClean="0"/>
+              <a:t>‹Nº›</a:t>
             </a:fld>
             <a:endParaRPr lang="en-US"/>
           </a:p>
@@ -931,7 +957,6 @@
               <a:rPr lang="en-US" smtClean="0"/>
               <a:t>Click to edit Master text styles</a:t>
             </a:r>
-            <a:endParaRPr lang="en-US" smtClean="0"/>
           </a:p>
           <a:p>
             <a:pPr lvl="1"/>
@@ -939,7 +964,6 @@
               <a:rPr lang="en-US" smtClean="0"/>
               <a:t>Second level</a:t>
             </a:r>
-            <a:endParaRPr lang="en-US" smtClean="0"/>
           </a:p>
           <a:p>
             <a:pPr lvl="2"/>
@@ -947,7 +971,6 @@
               <a:rPr lang="en-US" smtClean="0"/>
               <a:t>Third level</a:t>
             </a:r>
-            <a:endParaRPr lang="en-US" smtClean="0"/>
           </a:p>
           <a:p>
             <a:pPr lvl="3"/>
@@ -955,7 +978,6 @@
               <a:rPr lang="en-US" smtClean="0"/>
               <a:t>Fourth level</a:t>
             </a:r>
-            <a:endParaRPr lang="en-US" smtClean="0"/>
           </a:p>
           <a:p>
             <a:pPr lvl="4"/>
@@ -984,6 +1006,7 @@
           <a:p>
             <a:fld id="{63A1C593-65D0-4073-BCC9-577B9352EA97}" type="datetimeFigureOut">
               <a:rPr lang="en-US" smtClean="0"/>
+              <a:t>12/11/2018</a:t>
             </a:fld>
             <a:endParaRPr lang="en-US"/>
           </a:p>
@@ -1025,6 +1048,7 @@
           <a:p>
             <a:fld id="{9B618960-8005-486C-9A75-10CB2AAC16F9}" type="slidenum">
               <a:rPr lang="en-US" smtClean="0"/>
+              <a:t>‹Nº›</a:t>
             </a:fld>
             <a:endParaRPr lang="en-US"/>
           </a:p>
@@ -1099,7 +1123,6 @@
               <a:rPr lang="en-US" smtClean="0"/>
               <a:t>Click to edit Master text styles</a:t>
             </a:r>
-            <a:endParaRPr lang="en-US" smtClean="0"/>
           </a:p>
           <a:p>
             <a:pPr lvl="1"/>
@@ -1107,7 +1130,6 @@
               <a:rPr lang="en-US" smtClean="0"/>
               <a:t>Second level</a:t>
             </a:r>
-            <a:endParaRPr lang="en-US" smtClean="0"/>
           </a:p>
           <a:p>
             <a:pPr lvl="2"/>
@@ -1115,7 +1137,6 @@
               <a:rPr lang="en-US" smtClean="0"/>
               <a:t>Third level</a:t>
             </a:r>
-            <a:endParaRPr lang="en-US" smtClean="0"/>
           </a:p>
           <a:p>
             <a:pPr lvl="3"/>
@@ -1123,7 +1144,6 @@
               <a:rPr lang="en-US" smtClean="0"/>
               <a:t>Fourth level</a:t>
             </a:r>
-            <a:endParaRPr lang="en-US" smtClean="0"/>
           </a:p>
           <a:p>
             <a:pPr lvl="4"/>
@@ -1152,6 +1172,7 @@
           <a:p>
             <a:fld id="{63A1C593-65D0-4073-BCC9-577B9352EA97}" type="datetimeFigureOut">
               <a:rPr lang="en-US" smtClean="0"/>
+              <a:t>12/11/2018</a:t>
             </a:fld>
             <a:endParaRPr lang="en-US"/>
           </a:p>
@@ -1193,6 +1214,7 @@
           <a:p>
             <a:fld id="{9B618960-8005-486C-9A75-10CB2AAC16F9}" type="slidenum">
               <a:rPr lang="en-US" smtClean="0"/>
+              <a:t>‹Nº›</a:t>
             </a:fld>
             <a:endParaRPr lang="en-US"/>
           </a:p>
@@ -1372,7 +1394,6 @@
               <a:rPr lang="en-US" smtClean="0"/>
               <a:t>Click to edit Master text styles</a:t>
             </a:r>
-            <a:endParaRPr lang="en-US" smtClean="0"/>
           </a:p>
         </p:txBody>
       </p:sp>
@@ -1393,6 +1414,7 @@
           <a:p>
             <a:fld id="{63A1C593-65D0-4073-BCC9-577B9352EA97}" type="datetimeFigureOut">
               <a:rPr lang="en-US" smtClean="0"/>
+              <a:t>12/11/2018</a:t>
             </a:fld>
             <a:endParaRPr lang="en-US"/>
           </a:p>
@@ -1434,6 +1456,7 @@
           <a:p>
             <a:fld id="{9B618960-8005-486C-9A75-10CB2AAC16F9}" type="slidenum">
               <a:rPr lang="en-US" smtClean="0"/>
+              <a:t>‹Nº›</a:t>
             </a:fld>
             <a:endParaRPr lang="en-US"/>
           </a:p>
@@ -1513,7 +1536,6 @@
               <a:rPr lang="en-US" smtClean="0"/>
               <a:t>Click to edit Master text styles</a:t>
             </a:r>
-            <a:endParaRPr lang="en-US" smtClean="0"/>
           </a:p>
           <a:p>
             <a:pPr lvl="1"/>
@@ -1521,7 +1543,6 @@
               <a:rPr lang="en-US" smtClean="0"/>
               <a:t>Second level</a:t>
             </a:r>
-            <a:endParaRPr lang="en-US" smtClean="0"/>
           </a:p>
           <a:p>
             <a:pPr lvl="2"/>
@@ -1529,7 +1550,6 @@
               <a:rPr lang="en-US" smtClean="0"/>
               <a:t>Third level</a:t>
             </a:r>
-            <a:endParaRPr lang="en-US" smtClean="0"/>
           </a:p>
           <a:p>
             <a:pPr lvl="3"/>
@@ -1537,7 +1557,6 @@
               <a:rPr lang="en-US" smtClean="0"/>
               <a:t>Fourth level</a:t>
             </a:r>
-            <a:endParaRPr lang="en-US" smtClean="0"/>
           </a:p>
           <a:p>
             <a:pPr lvl="4"/>
@@ -1574,7 +1593,6 @@
               <a:rPr lang="en-US" smtClean="0"/>
               <a:t>Click to edit Master text styles</a:t>
             </a:r>
-            <a:endParaRPr lang="en-US" smtClean="0"/>
           </a:p>
           <a:p>
             <a:pPr lvl="1"/>
@@ -1582,7 +1600,6 @@
               <a:rPr lang="en-US" smtClean="0"/>
               <a:t>Second level</a:t>
             </a:r>
-            <a:endParaRPr lang="en-US" smtClean="0"/>
           </a:p>
           <a:p>
             <a:pPr lvl="2"/>
@@ -1590,7 +1607,6 @@
               <a:rPr lang="en-US" smtClean="0"/>
               <a:t>Third level</a:t>
             </a:r>
-            <a:endParaRPr lang="en-US" smtClean="0"/>
           </a:p>
           <a:p>
             <a:pPr lvl="3"/>
@@ -1598,7 +1614,6 @@
               <a:rPr lang="en-US" smtClean="0"/>
               <a:t>Fourth level</a:t>
             </a:r>
-            <a:endParaRPr lang="en-US" smtClean="0"/>
           </a:p>
           <a:p>
             <a:pPr lvl="4"/>
@@ -1627,6 +1642,7 @@
           <a:p>
             <a:fld id="{63A1C593-65D0-4073-BCC9-577B9352EA97}" type="datetimeFigureOut">
               <a:rPr lang="en-US" smtClean="0"/>
+              <a:t>12/11/2018</a:t>
             </a:fld>
             <a:endParaRPr lang="en-US"/>
           </a:p>
@@ -1668,6 +1684,7 @@
           <a:p>
             <a:fld id="{9B618960-8005-486C-9A75-10CB2AAC16F9}" type="slidenum">
               <a:rPr lang="en-US" smtClean="0"/>
+              <a:t>‹Nº›</a:t>
             </a:fld>
             <a:endParaRPr lang="en-US"/>
           </a:p>
@@ -1789,7 +1806,6 @@
               <a:rPr lang="en-US" smtClean="0"/>
               <a:t>Click to edit Master text styles</a:t>
             </a:r>
-            <a:endParaRPr lang="en-US" smtClean="0"/>
           </a:p>
         </p:txBody>
       </p:sp>
@@ -1818,7 +1834,6 @@
               <a:rPr lang="en-US" smtClean="0"/>
               <a:t>Click to edit Master text styles</a:t>
             </a:r>
-            <a:endParaRPr lang="en-US" smtClean="0"/>
           </a:p>
           <a:p>
             <a:pPr lvl="1"/>
@@ -1826,7 +1841,6 @@
               <a:rPr lang="en-US" smtClean="0"/>
               <a:t>Second level</a:t>
             </a:r>
-            <a:endParaRPr lang="en-US" smtClean="0"/>
           </a:p>
           <a:p>
             <a:pPr lvl="2"/>
@@ -1834,7 +1848,6 @@
               <a:rPr lang="en-US" smtClean="0"/>
               <a:t>Third level</a:t>
             </a:r>
-            <a:endParaRPr lang="en-US" smtClean="0"/>
           </a:p>
           <a:p>
             <a:pPr lvl="3"/>
@@ -1842,7 +1855,6 @@
               <a:rPr lang="en-US" smtClean="0"/>
               <a:t>Fourth level</a:t>
             </a:r>
-            <a:endParaRPr lang="en-US" smtClean="0"/>
           </a:p>
           <a:p>
             <a:pPr lvl="4"/>
@@ -1916,7 +1928,6 @@
               <a:rPr lang="en-US" smtClean="0"/>
               <a:t>Click to edit Master text styles</a:t>
             </a:r>
-            <a:endParaRPr lang="en-US" smtClean="0"/>
           </a:p>
         </p:txBody>
       </p:sp>
@@ -1945,7 +1956,6 @@
               <a:rPr lang="en-US" smtClean="0"/>
               <a:t>Click to edit Master text styles</a:t>
             </a:r>
-            <a:endParaRPr lang="en-US" smtClean="0"/>
           </a:p>
           <a:p>
             <a:pPr lvl="1"/>
@@ -1953,7 +1963,6 @@
               <a:rPr lang="en-US" smtClean="0"/>
               <a:t>Second level</a:t>
             </a:r>
-            <a:endParaRPr lang="en-US" smtClean="0"/>
           </a:p>
           <a:p>
             <a:pPr lvl="2"/>
@@ -1961,7 +1970,6 @@
               <a:rPr lang="en-US" smtClean="0"/>
               <a:t>Third level</a:t>
             </a:r>
-            <a:endParaRPr lang="en-US" smtClean="0"/>
           </a:p>
           <a:p>
             <a:pPr lvl="3"/>
@@ -1969,7 +1977,6 @@
               <a:rPr lang="en-US" smtClean="0"/>
               <a:t>Fourth level</a:t>
             </a:r>
-            <a:endParaRPr lang="en-US" smtClean="0"/>
           </a:p>
           <a:p>
             <a:pPr lvl="4"/>
@@ -1998,6 +2005,7 @@
           <a:p>
             <a:fld id="{63A1C593-65D0-4073-BCC9-577B9352EA97}" type="datetimeFigureOut">
               <a:rPr lang="en-US" smtClean="0"/>
+              <a:t>12/11/2018</a:t>
             </a:fld>
             <a:endParaRPr lang="en-US"/>
           </a:p>
@@ -2039,6 +2047,7 @@
           <a:p>
             <a:fld id="{9B618960-8005-486C-9A75-10CB2AAC16F9}" type="slidenum">
               <a:rPr lang="en-US" smtClean="0"/>
+              <a:t>‹Nº›</a:t>
             </a:fld>
             <a:endParaRPr lang="en-US"/>
           </a:p>
@@ -2110,6 +2119,7 @@
           <a:p>
             <a:fld id="{63A1C593-65D0-4073-BCC9-577B9352EA97}" type="datetimeFigureOut">
               <a:rPr lang="en-US" smtClean="0"/>
+              <a:t>12/11/2018</a:t>
             </a:fld>
             <a:endParaRPr lang="en-US"/>
           </a:p>
@@ -2151,6 +2161,7 @@
           <a:p>
             <a:fld id="{9B618960-8005-486C-9A75-10CB2AAC16F9}" type="slidenum">
               <a:rPr lang="en-US" smtClean="0"/>
+              <a:t>‹Nº›</a:t>
             </a:fld>
             <a:endParaRPr lang="en-US"/>
           </a:p>
@@ -2199,6 +2210,7 @@
           <a:p>
             <a:fld id="{63A1C593-65D0-4073-BCC9-577B9352EA97}" type="datetimeFigureOut">
               <a:rPr lang="en-US" smtClean="0"/>
+              <a:t>12/11/2018</a:t>
             </a:fld>
             <a:endParaRPr lang="en-US"/>
           </a:p>
@@ -2240,6 +2252,7 @@
           <a:p>
             <a:fld id="{9B618960-8005-486C-9A75-10CB2AAC16F9}" type="slidenum">
               <a:rPr lang="en-US" smtClean="0"/>
+              <a:t>‹Nº›</a:t>
             </a:fld>
             <a:endParaRPr lang="en-US"/>
           </a:p>
@@ -2356,7 +2369,6 @@
               <a:rPr lang="en-US" smtClean="0"/>
               <a:t>Click to edit Master text styles</a:t>
             </a:r>
-            <a:endParaRPr lang="en-US" smtClean="0"/>
           </a:p>
           <a:p>
             <a:pPr lvl="1"/>
@@ -2364,7 +2376,6 @@
               <a:rPr lang="en-US" smtClean="0"/>
               <a:t>Second level</a:t>
             </a:r>
-            <a:endParaRPr lang="en-US" smtClean="0"/>
           </a:p>
           <a:p>
             <a:pPr lvl="2"/>
@@ -2372,7 +2383,6 @@
               <a:rPr lang="en-US" smtClean="0"/>
               <a:t>Third level</a:t>
             </a:r>
-            <a:endParaRPr lang="en-US" smtClean="0"/>
           </a:p>
           <a:p>
             <a:pPr lvl="3"/>
@@ -2380,7 +2390,6 @@
               <a:rPr lang="en-US" smtClean="0"/>
               <a:t>Fourth level</a:t>
             </a:r>
-            <a:endParaRPr lang="en-US" smtClean="0"/>
           </a:p>
           <a:p>
             <a:pPr lvl="4"/>
@@ -2454,7 +2463,6 @@
               <a:rPr lang="en-US" smtClean="0"/>
               <a:t>Click to edit Master text styles</a:t>
             </a:r>
-            <a:endParaRPr lang="en-US" smtClean="0"/>
           </a:p>
         </p:txBody>
       </p:sp>
@@ -2475,6 +2483,7 @@
           <a:p>
             <a:fld id="{63A1C593-65D0-4073-BCC9-577B9352EA97}" type="datetimeFigureOut">
               <a:rPr lang="en-US" smtClean="0"/>
+              <a:t>12/11/2018</a:t>
             </a:fld>
             <a:endParaRPr lang="en-US"/>
           </a:p>
@@ -2516,6 +2525,7 @@
           <a:p>
             <a:fld id="{9B618960-8005-486C-9A75-10CB2AAC16F9}" type="slidenum">
               <a:rPr lang="en-US" smtClean="0"/>
+              <a:t>‹Nº›</a:t>
             </a:fld>
             <a:endParaRPr lang="en-US"/>
           </a:p>
@@ -2702,7 +2712,6 @@
               <a:rPr lang="en-US" smtClean="0"/>
               <a:t>Click to edit Master text styles</a:t>
             </a:r>
-            <a:endParaRPr lang="en-US" smtClean="0"/>
           </a:p>
         </p:txBody>
       </p:sp>
@@ -2723,6 +2732,7 @@
           <a:p>
             <a:fld id="{63A1C593-65D0-4073-BCC9-577B9352EA97}" type="datetimeFigureOut">
               <a:rPr lang="en-US" smtClean="0"/>
+              <a:t>12/11/2018</a:t>
             </a:fld>
             <a:endParaRPr lang="en-US"/>
           </a:p>
@@ -2764,6 +2774,7 @@
           <a:p>
             <a:fld id="{9B618960-8005-486C-9A75-10CB2AAC16F9}" type="slidenum">
               <a:rPr lang="en-US" smtClean="0"/>
+              <a:t>‹Nº›</a:t>
             </a:fld>
             <a:endParaRPr lang="en-US"/>
           </a:p>
@@ -2804,11 +2815,20 @@
         <p:cNvGrpSpPr/>
         <p:nvPr/>
       </p:nvGrpSpPr>
-      <p:grpSpPr/>
+      <p:grpSpPr>
+        <a:xfrm>
+          <a:off x="0" y="0"/>
+          <a:ext cx="0" cy="0"/>
+          <a:chOff x="0" y="0"/>
+          <a:chExt cx="0" cy="0"/>
+        </a:xfrm>
+      </p:grpSpPr>
       <p:sp>
         <p:nvSpPr>
           <p:cNvPr id="1026" name="Title 1025"/>
-          <p:cNvSpPr/>
+          <p:cNvSpPr>
+            <a:spLocks noGrp="1"/>
+          </p:cNvSpPr>
           <p:nvPr>
             <p:ph type="title"/>
           </p:nvPr>
@@ -2828,6 +2848,7 @@
         </p:spPr>
         <p:txBody>
           <a:bodyPr anchor="ctr"/>
+          <a:lstStyle/>
           <a:p>
             <a:pPr lvl="0"/>
             <a:r>
@@ -2839,7 +2860,9 @@
       <p:sp>
         <p:nvSpPr>
           <p:cNvPr id="1027" name="Text Placeholder 1026"/>
-          <p:cNvSpPr/>
+          <p:cNvSpPr>
+            <a:spLocks noGrp="1"/>
+          </p:cNvSpPr>
           <p:nvPr>
             <p:ph type="body" idx="1"/>
           </p:nvPr>
@@ -2859,6 +2882,7 @@
         </p:spPr>
         <p:txBody>
           <a:bodyPr/>
+          <a:lstStyle/>
           <a:p>
             <a:pPr lvl="0"/>
             <a:r>
@@ -2894,7 +2918,9 @@
       <p:sp>
         <p:nvSpPr>
           <p:cNvPr id="1028" name="Date Placeholder 1027"/>
-          <p:cNvSpPr/>
+          <p:cNvSpPr>
+            <a:spLocks noGrp="1"/>
+          </p:cNvSpPr>
           <p:nvPr>
             <p:ph type="dt" sz="half" idx="2"/>
           </p:nvPr>
@@ -2922,6 +2948,7 @@
           <a:p>
             <a:fld id="{63A1C593-65D0-4073-BCC9-577B9352EA97}" type="datetimeFigureOut">
               <a:rPr lang="en-US" smtClean="0"/>
+              <a:t>12/11/2018</a:t>
             </a:fld>
             <a:endParaRPr lang="en-US"/>
           </a:p>
@@ -2930,7 +2957,9 @@
       <p:sp>
         <p:nvSpPr>
           <p:cNvPr id="1029" name="Footer Placeholder 1028"/>
-          <p:cNvSpPr/>
+          <p:cNvSpPr>
+            <a:spLocks noGrp="1"/>
+          </p:cNvSpPr>
           <p:nvPr>
             <p:ph type="ftr" sz="quarter" idx="3"/>
           </p:nvPr>
@@ -2963,7 +2992,9 @@
       <p:sp>
         <p:nvSpPr>
           <p:cNvPr id="1030" name="Slide Number Placeholder 1029"/>
-          <p:cNvSpPr/>
+          <p:cNvSpPr>
+            <a:spLocks noGrp="1"/>
+          </p:cNvSpPr>
           <p:nvPr>
             <p:ph type="sldNum" sz="quarter" idx="4"/>
           </p:nvPr>
@@ -2991,6 +3022,7 @@
           <a:p>
             <a:fld id="{9B618960-8005-486C-9A75-10CB2AAC16F9}" type="slidenum">
               <a:rPr lang="en-US" smtClean="0"/>
+              <a:t>‹Nº›</a:t>
             </a:fld>
             <a:endParaRPr lang="en-US"/>
           </a:p>
@@ -3494,7 +3526,6 @@
               <a:rPr lang="es-ES" altLang="en-US" sz="4400"/>
               <a:t>Group 01</a:t>
             </a:r>
-            <a:endParaRPr lang="es-ES" altLang="en-US" sz="4400"/>
           </a:p>
           <a:p>
             <a:pPr algn="r"/>
@@ -3510,7 +3541,6 @@
               <a:rPr lang="es-ES" altLang="en-US"/>
               <a:t>Antonio Hermose de Mingo</a:t>
             </a:r>
-            <a:endParaRPr lang="es-ES" altLang="en-US"/>
           </a:p>
           <a:p>
             <a:pPr algn="r"/>
@@ -3518,7 +3548,6 @@
               <a:rPr lang="es-ES" altLang="en-US"/>
               <a:t>Jose Daniel Jimenez Delgado</a:t>
             </a:r>
-            <a:endParaRPr lang="es-ES" altLang="en-US"/>
           </a:p>
           <a:p>
             <a:pPr algn="r"/>
@@ -3526,7 +3555,6 @@
               <a:rPr lang="es-ES" altLang="en-US"/>
               <a:t>Pablo Santamaría Cirac</a:t>
             </a:r>
-            <a:endParaRPr lang="es-ES" altLang="en-US"/>
           </a:p>
           <a:p>
             <a:pPr algn="r"/>
@@ -3534,7 +3562,6 @@
               <a:rPr lang="es-ES" altLang="en-US"/>
               <a:t>Gonzalo Santamaría de Paredes</a:t>
             </a:r>
-            <a:endParaRPr lang="es-ES" altLang="en-US"/>
           </a:p>
           <a:p>
             <a:pPr algn="r"/>
@@ -3542,7 +3569,6 @@
               <a:rPr lang="es-ES" altLang="en-US"/>
               <a:t>Alejandro Vizcaino Alemany</a:t>
             </a:r>
-            <a:endParaRPr lang="es-ES" altLang="en-US"/>
           </a:p>
         </p:txBody>
       </p:sp>
@@ -3563,7 +3589,14 @@
         <p:cNvGrpSpPr/>
         <p:nvPr/>
       </p:nvGrpSpPr>
-      <p:grpSpPr/>
+      <p:grpSpPr>
+        <a:xfrm>
+          <a:off x="0" y="0"/>
+          <a:ext cx="0" cy="0"/>
+          <a:chOff x="0" y="0"/>
+          <a:chExt cx="0" cy="0"/>
+        </a:xfrm>
+      </p:grpSpPr>
       <p:sp>
         <p:nvSpPr>
           <p:cNvPr id="2" name="Title 1"/>
@@ -3577,12 +3610,12 @@
         <p:spPr/>
         <p:txBody>
           <a:bodyPr/>
+          <a:lstStyle/>
           <a:p>
             <a:r>
               <a:rPr lang="es-ES" altLang="en-US"/>
               <a:t>Assignment 1</a:t>
             </a:r>
-            <a:endParaRPr lang="es-ES" altLang="en-US"/>
           </a:p>
         </p:txBody>
       </p:sp>
@@ -3599,19 +3632,18 @@
         <p:spPr/>
         <p:txBody>
           <a:bodyPr/>
+          <a:lstStyle/>
           <a:p>
             <a:r>
               <a:rPr lang="es-ES" altLang="en-US"/>
               <a:t>Public Schools Madrid</a:t>
             </a:r>
-            <a:endParaRPr lang="es-ES" altLang="en-US"/>
           </a:p>
           <a:p>
             <a:r>
               <a:rPr lang="es-ES" altLang="en-US"/>
               <a:t>Open Data License</a:t>
             </a:r>
-            <a:endParaRPr lang="es-ES" altLang="en-US"/>
           </a:p>
         </p:txBody>
       </p:sp>
@@ -3619,14 +3651,14 @@
         <p:nvPicPr>
           <p:cNvPr id="4" name="Content Placeholder 3" descr="colegio"/>
           <p:cNvPicPr>
-            <a:picLocks noChangeAspect="1"/>
+            <a:picLocks noGrp="1" noChangeAspect="1"/>
           </p:cNvPicPr>
           <p:nvPr>
             <p:ph sz="half" idx="2"/>
           </p:nvPr>
         </p:nvPicPr>
         <p:blipFill>
-          <a:blip r:embed="rId1"/>
+          <a:blip r:embed="rId2"/>
           <a:stretch>
             <a:fillRect/>
           </a:stretch>
@@ -3658,7 +3690,14 @@
         <p:cNvGrpSpPr/>
         <p:nvPr/>
       </p:nvGrpSpPr>
-      <p:grpSpPr/>
+      <p:grpSpPr>
+        <a:xfrm>
+          <a:off x="0" y="0"/>
+          <a:ext cx="0" cy="0"/>
+          <a:chOff x="0" y="0"/>
+          <a:chExt cx="0" cy="0"/>
+        </a:xfrm>
+      </p:grpSpPr>
       <p:sp>
         <p:nvSpPr>
           <p:cNvPr id="2" name="Title 1"/>
@@ -3672,12 +3711,12 @@
         <p:spPr/>
         <p:txBody>
           <a:bodyPr/>
+          <a:lstStyle/>
           <a:p>
             <a:r>
               <a:rPr lang="es-ES" altLang="en-US"/>
               <a:t>Assignmet 2</a:t>
             </a:r>
-            <a:endParaRPr lang="es-ES" altLang="en-US"/>
           </a:p>
         </p:txBody>
       </p:sp>
@@ -3699,19 +3738,18 @@
         </p:spPr>
         <p:txBody>
           <a:bodyPr/>
+          <a:lstStyle/>
           <a:p>
             <a:r>
               <a:rPr lang="es-ES" altLang="en-US"/>
               <a:t>Propose Ontology</a:t>
             </a:r>
-            <a:endParaRPr lang="es-ES" altLang="en-US"/>
           </a:p>
           <a:p>
             <a:r>
               <a:rPr lang="es-ES" altLang="en-US"/>
               <a:t>Naming strategy:</a:t>
             </a:r>
-            <a:endParaRPr lang="es-ES" altLang="en-US"/>
           </a:p>
           <a:p>
             <a:pPr lvl="1"/>
@@ -3719,7 +3757,6 @@
               <a:rPr lang="es-ES" altLang="en-US"/>
               <a:t>http://handsOn.org/Group1</a:t>
             </a:r>
-            <a:endParaRPr lang="es-ES" altLang="en-US"/>
           </a:p>
           <a:p>
             <a:pPr lvl="1"/>
@@ -3727,7 +3764,6 @@
               <a:rPr lang="es-ES" altLang="en-US"/>
               <a:t>http://handsOn.org/GroupResource</a:t>
             </a:r>
-            <a:endParaRPr lang="es-ES" altLang="en-US"/>
           </a:p>
         </p:txBody>
       </p:sp>
@@ -3735,14 +3771,14 @@
         <p:nvPicPr>
           <p:cNvPr id="4" name="Content Placeholder 3" descr="clases ontologia"/>
           <p:cNvPicPr>
-            <a:picLocks noChangeAspect="1"/>
+            <a:picLocks noGrp="1" noChangeAspect="1"/>
           </p:cNvPicPr>
           <p:nvPr>
             <p:ph sz="half" idx="2"/>
           </p:nvPr>
         </p:nvPicPr>
         <p:blipFill>
-          <a:blip r:embed="rId1"/>
+          <a:blip r:embed="rId2"/>
           <a:stretch>
             <a:fillRect/>
           </a:stretch>
@@ -3766,7 +3802,7 @@
           <p:nvPr/>
         </p:nvPicPr>
         <p:blipFill>
-          <a:blip r:embed="rId2"/>
+          <a:blip r:embed="rId3"/>
           <a:stretch>
             <a:fillRect/>
           </a:stretch>
@@ -3790,7 +3826,7 @@
           <p:nvPr/>
         </p:nvPicPr>
         <p:blipFill>
-          <a:blip r:embed="rId3"/>
+          <a:blip r:embed="rId4"/>
           <a:stretch>
             <a:fillRect/>
           </a:stretch>
@@ -3822,7 +3858,14 @@
         <p:cNvGrpSpPr/>
         <p:nvPr/>
       </p:nvGrpSpPr>
-      <p:grpSpPr/>
+      <p:grpSpPr>
+        <a:xfrm>
+          <a:off x="0" y="0"/>
+          <a:ext cx="0" cy="0"/>
+          <a:chOff x="0" y="0"/>
+          <a:chExt cx="0" cy="0"/>
+        </a:xfrm>
+      </p:grpSpPr>
       <p:sp>
         <p:nvSpPr>
           <p:cNvPr id="2" name="Title 1"/>
@@ -3836,12 +3879,12 @@
         <p:spPr/>
         <p:txBody>
           <a:bodyPr/>
+          <a:lstStyle/>
           <a:p>
             <a:r>
               <a:rPr lang="es-ES" altLang="en-US"/>
               <a:t>Assignment 3</a:t>
             </a:r>
-            <a:endParaRPr lang="es-ES" altLang="en-US"/>
           </a:p>
         </p:txBody>
       </p:sp>
@@ -3858,22 +3901,154 @@
         <p:spPr/>
         <p:txBody>
           <a:bodyPr/>
-          <a:p>
-            <a:r>
-              <a:rPr lang="es-ES" altLang="en-US"/>
-              <a:t>Fix data</a:t>
-            </a:r>
-            <a:endParaRPr lang="es-ES" altLang="en-US"/>
-          </a:p>
-          <a:p>
-            <a:r>
-              <a:rPr lang="es-ES" altLang="en-US"/>
-              <a:t>Create RDF</a:t>
-            </a:r>
-            <a:endParaRPr lang="es-ES" altLang="en-US"/>
-          </a:p>
-        </p:txBody>
-      </p:sp>
+          <a:lstStyle/>
+          <a:p>
+            <a:pPr marL="0" indent="0">
+              <a:buNone/>
+            </a:pPr>
+            <a:r>
+              <a:rPr lang="es-ES" altLang="en-US" dirty="0" smtClean="0"/>
+              <a:t>1) </a:t>
+            </a:r>
+            <a:r>
+              <a:rPr lang="es-ES" altLang="en-US" dirty="0" err="1" smtClean="0"/>
+              <a:t>Import</a:t>
+            </a:r>
+            <a:r>
+              <a:rPr lang="es-ES" altLang="en-US" dirty="0" smtClean="0"/>
+              <a:t> Project </a:t>
+            </a:r>
+            <a:endParaRPr lang="es-ES" altLang="en-US" sz="1800" dirty="0" smtClean="0"/>
+          </a:p>
+          <a:p>
+            <a:pPr marL="0" indent="0">
+              <a:buNone/>
+            </a:pPr>
+            <a:endParaRPr lang="es-ES" altLang="en-US" dirty="0"/>
+          </a:p>
+          <a:p>
+            <a:pPr marL="0" indent="0">
+              <a:buNone/>
+            </a:pPr>
+            <a:endParaRPr lang="es-ES" altLang="en-US" dirty="0" smtClean="0"/>
+          </a:p>
+          <a:p>
+            <a:pPr marL="0" indent="0">
+              <a:buNone/>
+            </a:pPr>
+            <a:endParaRPr lang="es-ES" altLang="en-US" dirty="0" smtClean="0"/>
+          </a:p>
+          <a:p>
+            <a:pPr marL="0" indent="0">
+              <a:buNone/>
+            </a:pPr>
+            <a:r>
+              <a:rPr lang="es-ES" altLang="en-US" dirty="0" smtClean="0"/>
+              <a:t>2) </a:t>
+            </a:r>
+            <a:r>
+              <a:rPr lang="es-ES" altLang="en-US" dirty="0" err="1" smtClean="0"/>
+              <a:t>Fix</a:t>
+            </a:r>
+            <a:r>
+              <a:rPr lang="es-ES" altLang="en-US" dirty="0" smtClean="0"/>
+              <a:t> data</a:t>
+            </a:r>
+          </a:p>
+          <a:p>
+            <a:r>
+              <a:rPr lang="es-ES" altLang="en-US" sz="2000" dirty="0" err="1" smtClean="0"/>
+              <a:t>Check</a:t>
+            </a:r>
+            <a:r>
+              <a:rPr lang="es-ES" altLang="en-US" sz="2000" dirty="0" smtClean="0"/>
+              <a:t> </a:t>
+            </a:r>
+            <a:r>
+              <a:rPr lang="es-ES" altLang="en-US" sz="2000" dirty="0" err="1" smtClean="0"/>
+              <a:t>for</a:t>
+            </a:r>
+            <a:r>
+              <a:rPr lang="es-ES" altLang="en-US" sz="2000" dirty="0" smtClean="0"/>
+              <a:t> </a:t>
+            </a:r>
+            <a:r>
+              <a:rPr lang="es-ES" altLang="en-US" sz="2000" dirty="0" err="1" smtClean="0"/>
+              <a:t>wrong</a:t>
+            </a:r>
+            <a:r>
+              <a:rPr lang="es-ES" altLang="en-US" sz="2000" dirty="0" smtClean="0"/>
+              <a:t> </a:t>
+            </a:r>
+            <a:r>
+              <a:rPr lang="es-ES" altLang="en-US" sz="2000" dirty="0" err="1" smtClean="0"/>
+              <a:t>characters</a:t>
+            </a:r>
+            <a:endParaRPr lang="es-ES" altLang="en-US" sz="2000" dirty="0" smtClean="0"/>
+          </a:p>
+          <a:p>
+            <a:r>
+              <a:rPr lang="es-ES" altLang="en-US" sz="2000" dirty="0" err="1" smtClean="0"/>
+              <a:t>Check</a:t>
+            </a:r>
+            <a:r>
+              <a:rPr lang="es-ES" altLang="en-US" sz="2000" dirty="0" smtClean="0"/>
+              <a:t> </a:t>
+            </a:r>
+            <a:r>
+              <a:rPr lang="es-ES" altLang="en-US" sz="2000" dirty="0" err="1" smtClean="0"/>
+              <a:t>for</a:t>
+            </a:r>
+            <a:r>
+              <a:rPr lang="es-ES" altLang="en-US" sz="2000" dirty="0" smtClean="0"/>
+              <a:t> </a:t>
+            </a:r>
+            <a:r>
+              <a:rPr lang="es-ES" altLang="en-US" sz="2000" dirty="0" err="1" smtClean="0"/>
+              <a:t>misspelling</a:t>
+            </a:r>
+            <a:r>
+              <a:rPr lang="es-ES" altLang="en-US" sz="2000" dirty="0" smtClean="0"/>
+              <a:t> </a:t>
+            </a:r>
+            <a:r>
+              <a:rPr lang="es-ES" altLang="en-US" sz="2000" dirty="0" err="1" smtClean="0"/>
+              <a:t>mistakes</a:t>
+            </a:r>
+            <a:endParaRPr lang="es-ES" altLang="en-US" sz="2000" dirty="0" smtClean="0"/>
+          </a:p>
+        </p:txBody>
+      </p:sp>
+      <p:pic>
+        <p:nvPicPr>
+          <p:cNvPr id="4" name="Imagen 3"/>
+          <p:cNvPicPr>
+            <a:picLocks noChangeAspect="1"/>
+          </p:cNvPicPr>
+          <p:nvPr/>
+        </p:nvPicPr>
+        <p:blipFill>
+          <a:blip r:embed="rId2">
+            <a:extLst>
+              <a:ext uri="{28A0092B-C50C-407E-A947-70E740481C1C}">
+                <a14:useLocalDpi xmlns:a14="http://schemas.microsoft.com/office/drawing/2010/main" val="0"/>
+              </a:ext>
+            </a:extLst>
+          </a:blip>
+          <a:stretch>
+            <a:fillRect/>
+          </a:stretch>
+        </p:blipFill>
+        <p:spPr>
+          <a:xfrm>
+            <a:off x="3995757" y="1600200"/>
+            <a:ext cx="5925377" cy="2362530"/>
+          </a:xfrm>
+          <a:prstGeom prst="rect">
+            <a:avLst/>
+          </a:prstGeom>
+        </p:spPr>
+      </p:pic>
     </p:spTree>
   </p:cSld>
   <p:clrMapOvr>
@@ -3891,32 +4066,17 @@
         <p:cNvGrpSpPr/>
         <p:nvPr/>
       </p:nvGrpSpPr>
-      <p:grpSpPr/>
-      <p:sp>
-        <p:nvSpPr>
-          <p:cNvPr id="2" name="Title 1"/>
-          <p:cNvSpPr>
-            <a:spLocks noGrp="1"/>
-          </p:cNvSpPr>
-          <p:nvPr>
-            <p:ph type="title"/>
-          </p:nvPr>
-        </p:nvSpPr>
-        <p:spPr/>
-        <p:txBody>
-          <a:bodyPr/>
-          <a:p>
-            <a:r>
-              <a:rPr lang="es-ES" altLang="en-US"/>
-              <a:t>Assignment 4</a:t>
-            </a:r>
-            <a:endParaRPr lang="es-ES" altLang="en-US"/>
-          </a:p>
-        </p:txBody>
-      </p:sp>
-      <p:sp>
-        <p:nvSpPr>
-          <p:cNvPr id="3" name="Content Placeholder 2"/>
+      <p:grpSpPr>
+        <a:xfrm>
+          <a:off x="0" y="0"/>
+          <a:ext cx="0" cy="0"/>
+          <a:chOff x="0" y="0"/>
+          <a:chExt cx="0" cy="0"/>
+        </a:xfrm>
+      </p:grpSpPr>
+      <p:sp>
+        <p:nvSpPr>
+          <p:cNvPr id="3" name="Marcador de contenido 2"/>
           <p:cNvSpPr>
             <a:spLocks noGrp="1"/>
           </p:cNvSpPr>
@@ -3924,19 +4084,198 @@
             <p:ph idx="1"/>
           </p:nvPr>
         </p:nvSpPr>
-        <p:spPr/>
-        <p:txBody>
-          <a:bodyPr/>
-          <a:p>
-            <a:r>
-              <a:rPr lang="es-ES" altLang="en-US"/>
-              <a:t>Data linking</a:t>
-            </a:r>
-            <a:endParaRPr lang="es-ES" altLang="en-US"/>
-          </a:p>
-        </p:txBody>
-      </p:sp>
+        <p:spPr>
+          <a:xfrm>
+            <a:off x="609600" y="228600"/>
+            <a:ext cx="10972800" cy="5897563"/>
+          </a:xfrm>
+        </p:spPr>
+        <p:txBody>
+          <a:bodyPr/>
+          <a:lstStyle/>
+          <a:p>
+            <a:pPr marL="0" indent="0">
+              <a:buNone/>
+            </a:pPr>
+            <a:r>
+              <a:rPr lang="es-ES" altLang="en-US" dirty="0"/>
+              <a:t>3) </a:t>
+            </a:r>
+            <a:r>
+              <a:rPr lang="es-ES" altLang="en-US" dirty="0" err="1"/>
+              <a:t>Create</a:t>
+            </a:r>
+            <a:r>
+              <a:rPr lang="es-ES" altLang="en-US" dirty="0"/>
+              <a:t> RDF</a:t>
+            </a:r>
+          </a:p>
+          <a:p>
+            <a:r>
+              <a:rPr lang="es-ES" altLang="en-US" sz="1800" dirty="0" smtClean="0"/>
+              <a:t>RDF -&gt; </a:t>
+            </a:r>
+            <a:r>
+              <a:rPr lang="es-ES" altLang="en-US" sz="1800" dirty="0" err="1" smtClean="0"/>
+              <a:t>Edit</a:t>
+            </a:r>
+            <a:r>
+              <a:rPr lang="es-ES" altLang="en-US" sz="1800" dirty="0" smtClean="0"/>
+              <a:t> RDF </a:t>
+            </a:r>
+            <a:r>
+              <a:rPr lang="es-ES" altLang="en-US" sz="1800" dirty="0" err="1" smtClean="0"/>
+              <a:t>skeleton</a:t>
+            </a:r>
+            <a:r>
+              <a:rPr lang="es-ES" altLang="en-US" sz="1800" dirty="0" smtClean="0"/>
+              <a:t>…</a:t>
+            </a:r>
+          </a:p>
+          <a:p>
+            <a:r>
+              <a:rPr lang="es-ES" altLang="en-US" sz="1800" dirty="0" smtClean="0"/>
+              <a:t>Use </a:t>
+            </a:r>
+            <a:r>
+              <a:rPr lang="es-ES" altLang="en-US" sz="1800" dirty="0" err="1"/>
+              <a:t>o</a:t>
+            </a:r>
+            <a:r>
+              <a:rPr lang="es-ES" altLang="en-US" sz="1800" dirty="0" err="1" smtClean="0"/>
+              <a:t>ntology</a:t>
+            </a:r>
+            <a:endParaRPr lang="es-ES" altLang="en-US" sz="1800" dirty="0" smtClean="0"/>
+          </a:p>
+          <a:p>
+            <a:pPr marL="0" indent="0">
+              <a:buNone/>
+            </a:pPr>
+            <a:endParaRPr lang="es-ES" altLang="en-US" dirty="0"/>
+          </a:p>
+          <a:p>
+            <a:pPr marL="0" indent="0">
+              <a:buNone/>
+            </a:pPr>
+            <a:endParaRPr lang="es-ES" altLang="en-US" dirty="0" smtClean="0"/>
+          </a:p>
+          <a:p>
+            <a:pPr marL="0" indent="0">
+              <a:buNone/>
+            </a:pPr>
+            <a:endParaRPr lang="es-ES" altLang="en-US" dirty="0" smtClean="0"/>
+          </a:p>
+          <a:p>
+            <a:pPr marL="0" indent="0">
+              <a:buNone/>
+            </a:pPr>
+            <a:r>
+              <a:rPr lang="es-ES" altLang="en-US" dirty="0" smtClean="0"/>
+              <a:t>4</a:t>
+            </a:r>
+            <a:r>
+              <a:rPr lang="es-ES" altLang="en-US" dirty="0"/>
+              <a:t>) </a:t>
+            </a:r>
+            <a:r>
+              <a:rPr lang="es-ES" altLang="en-US" dirty="0" err="1"/>
+              <a:t>Export</a:t>
+            </a:r>
+            <a:r>
+              <a:rPr lang="es-ES" altLang="en-US" dirty="0"/>
+              <a:t> </a:t>
+            </a:r>
+            <a:r>
+              <a:rPr lang="es-ES" altLang="en-US" dirty="0" smtClean="0"/>
+              <a:t>JSON</a:t>
+            </a:r>
+          </a:p>
+          <a:p>
+            <a:r>
+              <a:rPr lang="es-ES" altLang="en-US" sz="1800" dirty="0" err="1" smtClean="0"/>
+              <a:t>Undo</a:t>
+            </a:r>
+            <a:r>
+              <a:rPr lang="es-ES" altLang="en-US" sz="1800" dirty="0" smtClean="0"/>
+              <a:t>/Redo -&gt; </a:t>
+            </a:r>
+            <a:r>
+              <a:rPr lang="es-ES" altLang="en-US" sz="1800" dirty="0" err="1" smtClean="0"/>
+              <a:t>Extract</a:t>
+            </a:r>
+            <a:r>
+              <a:rPr lang="es-ES" altLang="en-US" sz="1800" dirty="0" smtClean="0"/>
+              <a:t>…</a:t>
+            </a:r>
+          </a:p>
+        </p:txBody>
+      </p:sp>
+      <p:pic>
+        <p:nvPicPr>
+          <p:cNvPr id="4" name="Imagen 3"/>
+          <p:cNvPicPr>
+            <a:picLocks noChangeAspect="1"/>
+          </p:cNvPicPr>
+          <p:nvPr/>
+        </p:nvPicPr>
+        <p:blipFill>
+          <a:blip r:embed="rId2">
+            <a:extLst>
+              <a:ext uri="{28A0092B-C50C-407E-A947-70E740481C1C}">
+                <a14:useLocalDpi xmlns:a14="http://schemas.microsoft.com/office/drawing/2010/main" val="0"/>
+              </a:ext>
+            </a:extLst>
+          </a:blip>
+          <a:stretch>
+            <a:fillRect/>
+          </a:stretch>
+        </p:blipFill>
+        <p:spPr>
+          <a:xfrm>
+            <a:off x="4556564" y="112063"/>
+            <a:ext cx="5932520" cy="3065318"/>
+          </a:xfrm>
+          <a:prstGeom prst="rect">
+            <a:avLst/>
+          </a:prstGeom>
+        </p:spPr>
+      </p:pic>
+      <p:pic>
+        <p:nvPicPr>
+          <p:cNvPr id="5" name="Imagen 4"/>
+          <p:cNvPicPr>
+            <a:picLocks noChangeAspect="1"/>
+          </p:cNvPicPr>
+          <p:nvPr/>
+        </p:nvPicPr>
+        <p:blipFill>
+          <a:blip r:embed="rId3">
+            <a:extLst>
+              <a:ext uri="{28A0092B-C50C-407E-A947-70E740481C1C}">
+                <a14:useLocalDpi xmlns:a14="http://schemas.microsoft.com/office/drawing/2010/main" val="0"/>
+              </a:ext>
+            </a:extLst>
+          </a:blip>
+          <a:stretch>
+            <a:fillRect/>
+          </a:stretch>
+        </p:blipFill>
+        <p:spPr>
+          <a:xfrm>
+            <a:off x="4556564" y="3293918"/>
+            <a:ext cx="5788020" cy="3385750"/>
+          </a:xfrm>
+          <a:prstGeom prst="rect">
+            <a:avLst/>
+          </a:prstGeom>
+        </p:spPr>
+      </p:pic>
     </p:spTree>
+    <p:extLst>
+      <p:ext uri="{BB962C8B-B14F-4D97-AF65-F5344CB8AC3E}">
+        <p14:creationId xmlns:p14="http://schemas.microsoft.com/office/powerpoint/2010/main" val="3158434941"/>
+      </p:ext>
+    </p:extLst>
   </p:cSld>
   <p:clrMapOvr>
     <a:masterClrMapping/>
@@ -3953,7 +4292,14 @@
         <p:cNvGrpSpPr/>
         <p:nvPr/>
       </p:nvGrpSpPr>
-      <p:grpSpPr/>
+      <p:grpSpPr>
+        <a:xfrm>
+          <a:off x="0" y="0"/>
+          <a:ext cx="0" cy="0"/>
+          <a:chOff x="0" y="0"/>
+          <a:chExt cx="0" cy="0"/>
+        </a:xfrm>
+      </p:grpSpPr>
       <p:sp>
         <p:nvSpPr>
           <p:cNvPr id="2" name="Title 1"/>
@@ -3967,12 +4313,12 @@
         <p:spPr/>
         <p:txBody>
           <a:bodyPr/>
+          <a:lstStyle/>
           <a:p>
             <a:r>
               <a:rPr lang="es-ES" altLang="en-US"/>
-              <a:t>Assignment 5</a:t>
-            </a:r>
-            <a:endParaRPr lang="es-ES" altLang="en-US"/>
+              <a:t>Assignment 4</a:t>
+            </a:r>
           </a:p>
         </p:txBody>
       </p:sp>
@@ -3989,12 +4335,12 @@
         <p:spPr/>
         <p:txBody>
           <a:bodyPr/>
+          <a:lstStyle/>
           <a:p>
             <a:r>
               <a:rPr lang="es-ES" altLang="en-US"/>
-              <a:t>Update with existing ontologies</a:t>
-            </a:r>
-            <a:endParaRPr lang="es-ES" altLang="en-US"/>
+              <a:t>Data linking</a:t>
+            </a:r>
           </a:p>
         </p:txBody>
       </p:sp>
@@ -4015,7 +4361,14 @@
         <p:cNvGrpSpPr/>
         <p:nvPr/>
       </p:nvGrpSpPr>
-      <p:grpSpPr/>
+      <p:grpSpPr>
+        <a:xfrm>
+          <a:off x="0" y="0"/>
+          <a:ext cx="0" cy="0"/>
+          <a:chOff x="0" y="0"/>
+          <a:chExt cx="0" cy="0"/>
+        </a:xfrm>
+      </p:grpSpPr>
       <p:sp>
         <p:nvSpPr>
           <p:cNvPr id="2" name="Title 1"/>
@@ -4029,12 +4382,81 @@
         <p:spPr/>
         <p:txBody>
           <a:bodyPr/>
+          <a:lstStyle/>
+          <a:p>
+            <a:r>
+              <a:rPr lang="es-ES" altLang="en-US"/>
+              <a:t>Assignment 5</a:t>
+            </a:r>
+          </a:p>
+        </p:txBody>
+      </p:sp>
+      <p:sp>
+        <p:nvSpPr>
+          <p:cNvPr id="3" name="Content Placeholder 2"/>
+          <p:cNvSpPr>
+            <a:spLocks noGrp="1"/>
+          </p:cNvSpPr>
+          <p:nvPr>
+            <p:ph idx="1"/>
+          </p:nvPr>
+        </p:nvSpPr>
+        <p:spPr/>
+        <p:txBody>
+          <a:bodyPr/>
+          <a:lstStyle/>
+          <a:p>
+            <a:r>
+              <a:rPr lang="es-ES" altLang="en-US"/>
+              <a:t>Update with existing ontologies</a:t>
+            </a:r>
+          </a:p>
+        </p:txBody>
+      </p:sp>
+    </p:spTree>
+  </p:cSld>
+  <p:clrMapOvr>
+    <a:masterClrMapping/>
+  </p:clrMapOvr>
+</p:sld>
+</file>
+
+<file path=ppt/slides/slide8.xml><?xml version="1.0" encoding="utf-8"?>
+<p:sld xmlns:a="http://schemas.openxmlformats.org/drawingml/2006/main" xmlns:r="http://schemas.openxmlformats.org/officeDocument/2006/relationships" xmlns:p="http://schemas.openxmlformats.org/presentationml/2006/main">
+  <p:cSld>
+    <p:spTree>
+      <p:nvGrpSpPr>
+        <p:cNvPr id="1" name=""/>
+        <p:cNvGrpSpPr/>
+        <p:nvPr/>
+      </p:nvGrpSpPr>
+      <p:grpSpPr>
+        <a:xfrm>
+          <a:off x="0" y="0"/>
+          <a:ext cx="0" cy="0"/>
+          <a:chOff x="0" y="0"/>
+          <a:chExt cx="0" cy="0"/>
+        </a:xfrm>
+      </p:grpSpPr>
+      <p:sp>
+        <p:nvSpPr>
+          <p:cNvPr id="2" name="Title 1"/>
+          <p:cNvSpPr>
+            <a:spLocks noGrp="1"/>
+          </p:cNvSpPr>
+          <p:nvPr>
+            <p:ph type="title"/>
+          </p:nvPr>
+        </p:nvSpPr>
+        <p:spPr/>
+        <p:txBody>
+          <a:bodyPr/>
+          <a:lstStyle/>
           <a:p>
             <a:r>
               <a:rPr lang="es-ES" altLang="en-US"/>
               <a:t>Conclussions</a:t>
             </a:r>
-            <a:endParaRPr lang="es-ES" altLang="en-US"/>
           </a:p>
         </p:txBody>
       </p:sp>
@@ -4051,19 +4473,18 @@
         <p:spPr/>
         <p:txBody>
           <a:bodyPr/>
+          <a:lstStyle/>
           <a:p>
             <a:r>
               <a:rPr lang="es-ES" altLang="en-US"/>
               <a:t>Wide project</a:t>
             </a:r>
-            <a:endParaRPr lang="es-ES" altLang="en-US"/>
           </a:p>
           <a:p>
             <a:r>
               <a:rPr lang="es-ES" altLang="en-US"/>
               <a:t>Usefull real life applications</a:t>
             </a:r>
-            <a:endParaRPr lang="es-ES" altLang="en-US"/>
           </a:p>
           <a:p>
             <a:pPr marL="0" indent="0">
@@ -4272,6 +4693,7 @@
       </a:bgFillStyleLst>
     </a:fmtScheme>
   </a:themeElements>
+  <a:objectDefaults/>
   <a:extraClrSchemeLst>
     <a:extraClrScheme>
       <a:clrScheme name="">
@@ -5025,6 +5447,8 @@
       </a:bgFillStyleLst>
     </a:fmtScheme>
   </a:themeElements>
+  <a:objectDefaults/>
+  <a:extraClrSchemeLst/>
   <a:extLst>
     <a:ext uri="{05A4C25C-085E-4340-85A3-A5531E510DB2}">
       <thm15:themeFamily xmlns:thm15="http://schemas.microsoft.com/office/thememl/2012/main" name="Office Theme" id="{62F939B6-93AF-4DB8-9C6B-D6C7DFDC589F}" vid="{4A3C46E8-61CC-4603-A589-7422A47A8E4A}"/>

</xml_diff>

<commit_message>
Cambio en Assignment 2
</commit_message>
<xml_diff>
--- a/Presentacion.pptx
+++ b/Presentacion.pptx
@@ -5,18 +5,18 @@
     <p:sldMasterId id="2147483648" r:id="rId1"/>
   </p:sldMasterIdLst>
   <p:notesMasterIdLst>
-    <p:notesMasterId r:id="rId11"/>
+    <p:notesMasterId r:id="rId4"/>
   </p:notesMasterIdLst>
   <p:sldIdLst>
-    <p:sldId id="256" r:id="rId2"/>
-    <p:sldId id="257" r:id="rId3"/>
-    <p:sldId id="264" r:id="rId4"/>
-    <p:sldId id="258" r:id="rId5"/>
-    <p:sldId id="259" r:id="rId6"/>
-    <p:sldId id="263" r:id="rId7"/>
-    <p:sldId id="260" r:id="rId8"/>
-    <p:sldId id="261" r:id="rId9"/>
-    <p:sldId id="262" r:id="rId10"/>
+    <p:sldId id="256" r:id="rId3"/>
+    <p:sldId id="257" r:id="rId5"/>
+    <p:sldId id="264" r:id="rId6"/>
+    <p:sldId id="258" r:id="rId7"/>
+    <p:sldId id="259" r:id="rId8"/>
+    <p:sldId id="263" r:id="rId9"/>
+    <p:sldId id="260" r:id="rId10"/>
+    <p:sldId id="261" r:id="rId11"/>
+    <p:sldId id="262" r:id="rId12"/>
   </p:sldIdLst>
   <p:sldSz cx="12192000" cy="6858000"/>
   <p:notesSz cx="6858000" cy="9144000"/>
@@ -115,11 +115,6 @@
       </a:defRPr>
     </a:lvl9pPr>
   </p:defaultTextStyle>
-  <p:extLst>
-    <p:ext uri="{EFAFB233-063F-42B5-8137-9DF3F51BA10A}">
-      <p15:sldGuideLst xmlns:p15="http://schemas.microsoft.com/office/powerpoint/2012/main"/>
-    </p:ext>
-  </p:extLst>
 </p:presentation>
 </file>
 
@@ -205,7 +200,6 @@
           <a:p>
             <a:fld id="{3EFD42F7-718C-4B98-AAEC-167E6DDD60A7}" type="datetimeFigureOut">
               <a:rPr lang="en-US" smtClean="0"/>
-              <a:t>12/12/2018</a:t>
             </a:fld>
             <a:endParaRPr lang="en-US"/>
           </a:p>
@@ -272,6 +266,7 @@
               <a:rPr lang="en-US" smtClean="0"/>
               <a:t>Click to edit Master text styles</a:t>
             </a:r>
+            <a:endParaRPr lang="en-US" smtClean="0"/>
           </a:p>
           <a:p>
             <a:pPr lvl="1"/>
@@ -279,6 +274,7 @@
               <a:rPr lang="en-US" smtClean="0"/>
               <a:t>Second level</a:t>
             </a:r>
+            <a:endParaRPr lang="en-US" smtClean="0"/>
           </a:p>
           <a:p>
             <a:pPr lvl="2"/>
@@ -286,6 +282,7 @@
               <a:rPr lang="en-US" smtClean="0"/>
               <a:t>Third level</a:t>
             </a:r>
+            <a:endParaRPr lang="en-US" smtClean="0"/>
           </a:p>
           <a:p>
             <a:pPr lvl="3"/>
@@ -293,6 +290,7 @@
               <a:rPr lang="en-US" smtClean="0"/>
               <a:t>Fourth level</a:t>
             </a:r>
+            <a:endParaRPr lang="en-US" smtClean="0"/>
           </a:p>
           <a:p>
             <a:pPr lvl="4"/>
@@ -364,18 +362,12 @@
           <a:p>
             <a:fld id="{21B2AA4F-B828-4D7C-AFD3-893933DAFCB4}" type="slidenum">
               <a:rPr lang="en-US" smtClean="0"/>
-              <a:t>‹Nº›</a:t>
             </a:fld>
             <a:endParaRPr lang="en-US"/>
           </a:p>
         </p:txBody>
       </p:sp>
     </p:spTree>
-    <p:extLst>
-      <p:ext uri="{BB962C8B-B14F-4D97-AF65-F5344CB8AC3E}">
-        <p14:creationId xmlns:p14="http://schemas.microsoft.com/office/powerpoint/2010/main" val="4009764286"/>
-      </p:ext>
-    </p:extLst>
   </p:cSld>
   <p:clrMap bg1="lt1" tx1="dk1" bg2="lt2" tx2="dk2" accent1="accent1" accent2="accent2" accent3="accent3" accent4="accent4" accent5="accent5" accent6="accent6" hlink="hlink" folHlink="folHlink"/>
   <p:notesStyle>
@@ -522,11 +514,6 @@
         </p:txBody>
       </p:sp>
     </p:spTree>
-    <p:extLst>
-      <p:ext uri="{BB962C8B-B14F-4D97-AF65-F5344CB8AC3E}">
-        <p14:creationId xmlns:p14="http://schemas.microsoft.com/office/powerpoint/2010/main" val="3817410458"/>
-      </p:ext>
-    </p:extLst>
   </p:cSld>
   <p:clrMapOvr>
     <a:masterClrMapping/>
@@ -665,7 +652,6 @@
           <a:p>
             <a:fld id="{63A1C593-65D0-4073-BCC9-577B9352EA97}" type="datetimeFigureOut">
               <a:rPr lang="en-US" smtClean="0"/>
-              <a:t>12/12/2018</a:t>
             </a:fld>
             <a:endParaRPr lang="en-US"/>
           </a:p>
@@ -707,7 +693,6 @@
           <a:p>
             <a:fld id="{9B618960-8005-486C-9A75-10CB2AAC16F9}" type="slidenum">
               <a:rPr lang="en-US" smtClean="0"/>
-              <a:t>‹Nº›</a:t>
             </a:fld>
             <a:endParaRPr lang="en-US"/>
           </a:p>
@@ -782,6 +767,7 @@
               <a:rPr lang="en-US" smtClean="0"/>
               <a:t>Click to edit Master text styles</a:t>
             </a:r>
+            <a:endParaRPr lang="en-US" smtClean="0"/>
           </a:p>
           <a:p>
             <a:pPr lvl="1"/>
@@ -789,6 +775,7 @@
               <a:rPr lang="en-US" smtClean="0"/>
               <a:t>Second level</a:t>
             </a:r>
+            <a:endParaRPr lang="en-US" smtClean="0"/>
           </a:p>
           <a:p>
             <a:pPr lvl="2"/>
@@ -796,6 +783,7 @@
               <a:rPr lang="en-US" smtClean="0"/>
               <a:t>Third level</a:t>
             </a:r>
+            <a:endParaRPr lang="en-US" smtClean="0"/>
           </a:p>
           <a:p>
             <a:pPr lvl="3"/>
@@ -803,6 +791,7 @@
               <a:rPr lang="en-US" smtClean="0"/>
               <a:t>Fourth level</a:t>
             </a:r>
+            <a:endParaRPr lang="en-US" smtClean="0"/>
           </a:p>
           <a:p>
             <a:pPr lvl="4"/>
@@ -831,7 +820,6 @@
           <a:p>
             <a:fld id="{63A1C593-65D0-4073-BCC9-577B9352EA97}" type="datetimeFigureOut">
               <a:rPr lang="en-US" smtClean="0"/>
-              <a:t>12/12/2018</a:t>
             </a:fld>
             <a:endParaRPr lang="en-US"/>
           </a:p>
@@ -873,7 +861,6 @@
           <a:p>
             <a:fld id="{9B618960-8005-486C-9A75-10CB2AAC16F9}" type="slidenum">
               <a:rPr lang="en-US" smtClean="0"/>
-              <a:t>‹Nº›</a:t>
             </a:fld>
             <a:endParaRPr lang="en-US"/>
           </a:p>
@@ -958,6 +945,7 @@
               <a:rPr lang="en-US" smtClean="0"/>
               <a:t>Click to edit Master text styles</a:t>
             </a:r>
+            <a:endParaRPr lang="en-US" smtClean="0"/>
           </a:p>
           <a:p>
             <a:pPr lvl="1"/>
@@ -965,6 +953,7 @@
               <a:rPr lang="en-US" smtClean="0"/>
               <a:t>Second level</a:t>
             </a:r>
+            <a:endParaRPr lang="en-US" smtClean="0"/>
           </a:p>
           <a:p>
             <a:pPr lvl="2"/>
@@ -972,6 +961,7 @@
               <a:rPr lang="en-US" smtClean="0"/>
               <a:t>Third level</a:t>
             </a:r>
+            <a:endParaRPr lang="en-US" smtClean="0"/>
           </a:p>
           <a:p>
             <a:pPr lvl="3"/>
@@ -979,6 +969,7 @@
               <a:rPr lang="en-US" smtClean="0"/>
               <a:t>Fourth level</a:t>
             </a:r>
+            <a:endParaRPr lang="en-US" smtClean="0"/>
           </a:p>
           <a:p>
             <a:pPr lvl="4"/>
@@ -1007,7 +998,6 @@
           <a:p>
             <a:fld id="{63A1C593-65D0-4073-BCC9-577B9352EA97}" type="datetimeFigureOut">
               <a:rPr lang="en-US" smtClean="0"/>
-              <a:t>12/12/2018</a:t>
             </a:fld>
             <a:endParaRPr lang="en-US"/>
           </a:p>
@@ -1049,7 +1039,6 @@
           <a:p>
             <a:fld id="{9B618960-8005-486C-9A75-10CB2AAC16F9}" type="slidenum">
               <a:rPr lang="en-US" smtClean="0"/>
-              <a:t>‹Nº›</a:t>
             </a:fld>
             <a:endParaRPr lang="en-US"/>
           </a:p>
@@ -1124,6 +1113,7 @@
               <a:rPr lang="en-US" smtClean="0"/>
               <a:t>Click to edit Master text styles</a:t>
             </a:r>
+            <a:endParaRPr lang="en-US" smtClean="0"/>
           </a:p>
           <a:p>
             <a:pPr lvl="1"/>
@@ -1131,6 +1121,7 @@
               <a:rPr lang="en-US" smtClean="0"/>
               <a:t>Second level</a:t>
             </a:r>
+            <a:endParaRPr lang="en-US" smtClean="0"/>
           </a:p>
           <a:p>
             <a:pPr lvl="2"/>
@@ -1138,6 +1129,7 @@
               <a:rPr lang="en-US" smtClean="0"/>
               <a:t>Third level</a:t>
             </a:r>
+            <a:endParaRPr lang="en-US" smtClean="0"/>
           </a:p>
           <a:p>
             <a:pPr lvl="3"/>
@@ -1145,6 +1137,7 @@
               <a:rPr lang="en-US" smtClean="0"/>
               <a:t>Fourth level</a:t>
             </a:r>
+            <a:endParaRPr lang="en-US" smtClean="0"/>
           </a:p>
           <a:p>
             <a:pPr lvl="4"/>
@@ -1173,7 +1166,6 @@
           <a:p>
             <a:fld id="{63A1C593-65D0-4073-BCC9-577B9352EA97}" type="datetimeFigureOut">
               <a:rPr lang="en-US" smtClean="0"/>
-              <a:t>12/12/2018</a:t>
             </a:fld>
             <a:endParaRPr lang="en-US"/>
           </a:p>
@@ -1215,7 +1207,6 @@
           <a:p>
             <a:fld id="{9B618960-8005-486C-9A75-10CB2AAC16F9}" type="slidenum">
               <a:rPr lang="en-US" smtClean="0"/>
-              <a:t>‹Nº›</a:t>
             </a:fld>
             <a:endParaRPr lang="en-US"/>
           </a:p>
@@ -1395,6 +1386,7 @@
               <a:rPr lang="en-US" smtClean="0"/>
               <a:t>Click to edit Master text styles</a:t>
             </a:r>
+            <a:endParaRPr lang="en-US" smtClean="0"/>
           </a:p>
         </p:txBody>
       </p:sp>
@@ -1415,7 +1407,6 @@
           <a:p>
             <a:fld id="{63A1C593-65D0-4073-BCC9-577B9352EA97}" type="datetimeFigureOut">
               <a:rPr lang="en-US" smtClean="0"/>
-              <a:t>12/12/2018</a:t>
             </a:fld>
             <a:endParaRPr lang="en-US"/>
           </a:p>
@@ -1457,7 +1448,6 @@
           <a:p>
             <a:fld id="{9B618960-8005-486C-9A75-10CB2AAC16F9}" type="slidenum">
               <a:rPr lang="en-US" smtClean="0"/>
-              <a:t>‹Nº›</a:t>
             </a:fld>
             <a:endParaRPr lang="en-US"/>
           </a:p>
@@ -1537,6 +1527,7 @@
               <a:rPr lang="en-US" smtClean="0"/>
               <a:t>Click to edit Master text styles</a:t>
             </a:r>
+            <a:endParaRPr lang="en-US" smtClean="0"/>
           </a:p>
           <a:p>
             <a:pPr lvl="1"/>
@@ -1544,6 +1535,7 @@
               <a:rPr lang="en-US" smtClean="0"/>
               <a:t>Second level</a:t>
             </a:r>
+            <a:endParaRPr lang="en-US" smtClean="0"/>
           </a:p>
           <a:p>
             <a:pPr lvl="2"/>
@@ -1551,6 +1543,7 @@
               <a:rPr lang="en-US" smtClean="0"/>
               <a:t>Third level</a:t>
             </a:r>
+            <a:endParaRPr lang="en-US" smtClean="0"/>
           </a:p>
           <a:p>
             <a:pPr lvl="3"/>
@@ -1558,6 +1551,7 @@
               <a:rPr lang="en-US" smtClean="0"/>
               <a:t>Fourth level</a:t>
             </a:r>
+            <a:endParaRPr lang="en-US" smtClean="0"/>
           </a:p>
           <a:p>
             <a:pPr lvl="4"/>
@@ -1594,6 +1588,7 @@
               <a:rPr lang="en-US" smtClean="0"/>
               <a:t>Click to edit Master text styles</a:t>
             </a:r>
+            <a:endParaRPr lang="en-US" smtClean="0"/>
           </a:p>
           <a:p>
             <a:pPr lvl="1"/>
@@ -1601,6 +1596,7 @@
               <a:rPr lang="en-US" smtClean="0"/>
               <a:t>Second level</a:t>
             </a:r>
+            <a:endParaRPr lang="en-US" smtClean="0"/>
           </a:p>
           <a:p>
             <a:pPr lvl="2"/>
@@ -1608,6 +1604,7 @@
               <a:rPr lang="en-US" smtClean="0"/>
               <a:t>Third level</a:t>
             </a:r>
+            <a:endParaRPr lang="en-US" smtClean="0"/>
           </a:p>
           <a:p>
             <a:pPr lvl="3"/>
@@ -1615,6 +1612,7 @@
               <a:rPr lang="en-US" smtClean="0"/>
               <a:t>Fourth level</a:t>
             </a:r>
+            <a:endParaRPr lang="en-US" smtClean="0"/>
           </a:p>
           <a:p>
             <a:pPr lvl="4"/>
@@ -1643,7 +1641,6 @@
           <a:p>
             <a:fld id="{63A1C593-65D0-4073-BCC9-577B9352EA97}" type="datetimeFigureOut">
               <a:rPr lang="en-US" smtClean="0"/>
-              <a:t>12/12/2018</a:t>
             </a:fld>
             <a:endParaRPr lang="en-US"/>
           </a:p>
@@ -1685,7 +1682,6 @@
           <a:p>
             <a:fld id="{9B618960-8005-486C-9A75-10CB2AAC16F9}" type="slidenum">
               <a:rPr lang="en-US" smtClean="0"/>
-              <a:t>‹Nº›</a:t>
             </a:fld>
             <a:endParaRPr lang="en-US"/>
           </a:p>
@@ -1807,6 +1803,7 @@
               <a:rPr lang="en-US" smtClean="0"/>
               <a:t>Click to edit Master text styles</a:t>
             </a:r>
+            <a:endParaRPr lang="en-US" smtClean="0"/>
           </a:p>
         </p:txBody>
       </p:sp>
@@ -1835,6 +1832,7 @@
               <a:rPr lang="en-US" smtClean="0"/>
               <a:t>Click to edit Master text styles</a:t>
             </a:r>
+            <a:endParaRPr lang="en-US" smtClean="0"/>
           </a:p>
           <a:p>
             <a:pPr lvl="1"/>
@@ -1842,6 +1840,7 @@
               <a:rPr lang="en-US" smtClean="0"/>
               <a:t>Second level</a:t>
             </a:r>
+            <a:endParaRPr lang="en-US" smtClean="0"/>
           </a:p>
           <a:p>
             <a:pPr lvl="2"/>
@@ -1849,6 +1848,7 @@
               <a:rPr lang="en-US" smtClean="0"/>
               <a:t>Third level</a:t>
             </a:r>
+            <a:endParaRPr lang="en-US" smtClean="0"/>
           </a:p>
           <a:p>
             <a:pPr lvl="3"/>
@@ -1856,6 +1856,7 @@
               <a:rPr lang="en-US" smtClean="0"/>
               <a:t>Fourth level</a:t>
             </a:r>
+            <a:endParaRPr lang="en-US" smtClean="0"/>
           </a:p>
           <a:p>
             <a:pPr lvl="4"/>
@@ -1929,6 +1930,7 @@
               <a:rPr lang="en-US" smtClean="0"/>
               <a:t>Click to edit Master text styles</a:t>
             </a:r>
+            <a:endParaRPr lang="en-US" smtClean="0"/>
           </a:p>
         </p:txBody>
       </p:sp>
@@ -1957,6 +1959,7 @@
               <a:rPr lang="en-US" smtClean="0"/>
               <a:t>Click to edit Master text styles</a:t>
             </a:r>
+            <a:endParaRPr lang="en-US" smtClean="0"/>
           </a:p>
           <a:p>
             <a:pPr lvl="1"/>
@@ -1964,6 +1967,7 @@
               <a:rPr lang="en-US" smtClean="0"/>
               <a:t>Second level</a:t>
             </a:r>
+            <a:endParaRPr lang="en-US" smtClean="0"/>
           </a:p>
           <a:p>
             <a:pPr lvl="2"/>
@@ -1971,6 +1975,7 @@
               <a:rPr lang="en-US" smtClean="0"/>
               <a:t>Third level</a:t>
             </a:r>
+            <a:endParaRPr lang="en-US" smtClean="0"/>
           </a:p>
           <a:p>
             <a:pPr lvl="3"/>
@@ -1978,6 +1983,7 @@
               <a:rPr lang="en-US" smtClean="0"/>
               <a:t>Fourth level</a:t>
             </a:r>
+            <a:endParaRPr lang="en-US" smtClean="0"/>
           </a:p>
           <a:p>
             <a:pPr lvl="4"/>
@@ -2006,7 +2012,6 @@
           <a:p>
             <a:fld id="{63A1C593-65D0-4073-BCC9-577B9352EA97}" type="datetimeFigureOut">
               <a:rPr lang="en-US" smtClean="0"/>
-              <a:t>12/12/2018</a:t>
             </a:fld>
             <a:endParaRPr lang="en-US"/>
           </a:p>
@@ -2048,7 +2053,6 @@
           <a:p>
             <a:fld id="{9B618960-8005-486C-9A75-10CB2AAC16F9}" type="slidenum">
               <a:rPr lang="en-US" smtClean="0"/>
-              <a:t>‹Nº›</a:t>
             </a:fld>
             <a:endParaRPr lang="en-US"/>
           </a:p>
@@ -2120,7 +2124,6 @@
           <a:p>
             <a:fld id="{63A1C593-65D0-4073-BCC9-577B9352EA97}" type="datetimeFigureOut">
               <a:rPr lang="en-US" smtClean="0"/>
-              <a:t>12/12/2018</a:t>
             </a:fld>
             <a:endParaRPr lang="en-US"/>
           </a:p>
@@ -2162,7 +2165,6 @@
           <a:p>
             <a:fld id="{9B618960-8005-486C-9A75-10CB2AAC16F9}" type="slidenum">
               <a:rPr lang="en-US" smtClean="0"/>
-              <a:t>‹Nº›</a:t>
             </a:fld>
             <a:endParaRPr lang="en-US"/>
           </a:p>
@@ -2211,7 +2213,6 @@
           <a:p>
             <a:fld id="{63A1C593-65D0-4073-BCC9-577B9352EA97}" type="datetimeFigureOut">
               <a:rPr lang="en-US" smtClean="0"/>
-              <a:t>12/12/2018</a:t>
             </a:fld>
             <a:endParaRPr lang="en-US"/>
           </a:p>
@@ -2253,7 +2254,6 @@
           <a:p>
             <a:fld id="{9B618960-8005-486C-9A75-10CB2AAC16F9}" type="slidenum">
               <a:rPr lang="en-US" smtClean="0"/>
-              <a:t>‹Nº›</a:t>
             </a:fld>
             <a:endParaRPr lang="en-US"/>
           </a:p>
@@ -2370,6 +2370,7 @@
               <a:rPr lang="en-US" smtClean="0"/>
               <a:t>Click to edit Master text styles</a:t>
             </a:r>
+            <a:endParaRPr lang="en-US" smtClean="0"/>
           </a:p>
           <a:p>
             <a:pPr lvl="1"/>
@@ -2377,6 +2378,7 @@
               <a:rPr lang="en-US" smtClean="0"/>
               <a:t>Second level</a:t>
             </a:r>
+            <a:endParaRPr lang="en-US" smtClean="0"/>
           </a:p>
           <a:p>
             <a:pPr lvl="2"/>
@@ -2384,6 +2386,7 @@
               <a:rPr lang="en-US" smtClean="0"/>
               <a:t>Third level</a:t>
             </a:r>
+            <a:endParaRPr lang="en-US" smtClean="0"/>
           </a:p>
           <a:p>
             <a:pPr lvl="3"/>
@@ -2391,6 +2394,7 @@
               <a:rPr lang="en-US" smtClean="0"/>
               <a:t>Fourth level</a:t>
             </a:r>
+            <a:endParaRPr lang="en-US" smtClean="0"/>
           </a:p>
           <a:p>
             <a:pPr lvl="4"/>
@@ -2464,6 +2468,7 @@
               <a:rPr lang="en-US" smtClean="0"/>
               <a:t>Click to edit Master text styles</a:t>
             </a:r>
+            <a:endParaRPr lang="en-US" smtClean="0"/>
           </a:p>
         </p:txBody>
       </p:sp>
@@ -2484,7 +2489,6 @@
           <a:p>
             <a:fld id="{63A1C593-65D0-4073-BCC9-577B9352EA97}" type="datetimeFigureOut">
               <a:rPr lang="en-US" smtClean="0"/>
-              <a:t>12/12/2018</a:t>
             </a:fld>
             <a:endParaRPr lang="en-US"/>
           </a:p>
@@ -2526,7 +2530,6 @@
           <a:p>
             <a:fld id="{9B618960-8005-486C-9A75-10CB2AAC16F9}" type="slidenum">
               <a:rPr lang="en-US" smtClean="0"/>
-              <a:t>‹Nº›</a:t>
             </a:fld>
             <a:endParaRPr lang="en-US"/>
           </a:p>
@@ -2713,6 +2716,7 @@
               <a:rPr lang="en-US" smtClean="0"/>
               <a:t>Click to edit Master text styles</a:t>
             </a:r>
+            <a:endParaRPr lang="en-US" smtClean="0"/>
           </a:p>
         </p:txBody>
       </p:sp>
@@ -2733,7 +2737,6 @@
           <a:p>
             <a:fld id="{63A1C593-65D0-4073-BCC9-577B9352EA97}" type="datetimeFigureOut">
               <a:rPr lang="en-US" smtClean="0"/>
-              <a:t>12/12/2018</a:t>
             </a:fld>
             <a:endParaRPr lang="en-US"/>
           </a:p>
@@ -2775,7 +2778,6 @@
           <a:p>
             <a:fld id="{9B618960-8005-486C-9A75-10CB2AAC16F9}" type="slidenum">
               <a:rPr lang="en-US" smtClean="0"/>
-              <a:t>‹Nº›</a:t>
             </a:fld>
             <a:endParaRPr lang="en-US"/>
           </a:p>
@@ -2949,7 +2951,6 @@
           <a:p>
             <a:fld id="{63A1C593-65D0-4073-BCC9-577B9352EA97}" type="datetimeFigureOut">
               <a:rPr lang="en-US" smtClean="0"/>
-              <a:t>12/12/2018</a:t>
             </a:fld>
             <a:endParaRPr lang="en-US"/>
           </a:p>
@@ -3023,7 +3024,6 @@
           <a:p>
             <a:fld id="{9B618960-8005-486C-9A75-10CB2AAC16F9}" type="slidenum">
               <a:rPr lang="en-US" smtClean="0"/>
-              <a:t>‹Nº›</a:t>
             </a:fld>
             <a:endParaRPr lang="en-US"/>
           </a:p>
@@ -3527,6 +3527,7 @@
               <a:rPr lang="es-ES" altLang="en-US" sz="4400"/>
               <a:t>Group 01</a:t>
             </a:r>
+            <a:endParaRPr lang="es-ES" altLang="en-US" sz="4400"/>
           </a:p>
           <a:p>
             <a:pPr algn="r"/>
@@ -3542,6 +3543,7 @@
               <a:rPr lang="es-ES" altLang="en-US"/>
               <a:t>Antonio Hermose de Mingo</a:t>
             </a:r>
+            <a:endParaRPr lang="es-ES" altLang="en-US"/>
           </a:p>
           <a:p>
             <a:pPr algn="r"/>
@@ -3549,6 +3551,7 @@
               <a:rPr lang="es-ES" altLang="en-US"/>
               <a:t>Jose Daniel Jimenez Delgado</a:t>
             </a:r>
+            <a:endParaRPr lang="es-ES" altLang="en-US"/>
           </a:p>
           <a:p>
             <a:pPr algn="r"/>
@@ -3556,6 +3559,7 @@
               <a:rPr lang="es-ES" altLang="en-US"/>
               <a:t>Pablo Santamaría Cirac</a:t>
             </a:r>
+            <a:endParaRPr lang="es-ES" altLang="en-US"/>
           </a:p>
           <a:p>
             <a:pPr algn="r"/>
@@ -3563,6 +3567,7 @@
               <a:rPr lang="es-ES" altLang="en-US"/>
               <a:t>Gonzalo Santamaría de Paredes</a:t>
             </a:r>
+            <a:endParaRPr lang="es-ES" altLang="en-US"/>
           </a:p>
           <a:p>
             <a:pPr algn="r"/>
@@ -3570,6 +3575,7 @@
               <a:rPr lang="es-ES" altLang="en-US"/>
               <a:t>Alejandro Vizcaino Alemany</a:t>
             </a:r>
+            <a:endParaRPr lang="es-ES" altLang="en-US"/>
           </a:p>
         </p:txBody>
       </p:sp>
@@ -3719,7 +3725,7 @@
           </p:nvPr>
         </p:nvPicPr>
         <p:blipFill>
-          <a:blip r:embed="rId2"/>
+          <a:blip r:embed="rId1"/>
           <a:stretch>
             <a:fillRect/>
           </a:stretch>
@@ -3778,6 +3784,7 @@
               <a:rPr lang="es-ES" altLang="en-US"/>
               <a:t>Assignment 1</a:t>
             </a:r>
+            <a:endParaRPr lang="es-ES" altLang="en-US"/>
           </a:p>
         </p:txBody>
       </p:sp>
@@ -3893,6 +3900,7 @@
               <a:rPr lang="es-ES" altLang="en-US" dirty="0" smtClean="0"/>
               <a:t> as a CSV file</a:t>
             </a:r>
+            <a:endParaRPr lang="es-ES" altLang="en-US" dirty="0" smtClean="0"/>
           </a:p>
           <a:p>
             <a:pPr lvl="1"/>
@@ -3988,6 +3996,7 @@
               <a:rPr lang="es-ES" altLang="en-US" dirty="0" smtClean="0"/>
               <a:t>) </a:t>
             </a:r>
+            <a:endParaRPr lang="es-ES" altLang="en-US" dirty="0" smtClean="0"/>
           </a:p>
           <a:p>
             <a:pPr lvl="1"/>
@@ -3996,11 +4005,6 @@
         </p:txBody>
       </p:sp>
     </p:spTree>
-    <p:extLst>
-      <p:ext uri="{BB962C8B-B14F-4D97-AF65-F5344CB8AC3E}">
-        <p14:creationId xmlns:p14="http://schemas.microsoft.com/office/powerpoint/2010/main" val="3295882166"/>
-      </p:ext>
-    </p:extLst>
   </p:cSld>
   <p:clrMapOvr>
     <a:masterClrMapping/>
@@ -4044,6 +4048,7 @@
               <a:rPr lang="es-ES" altLang="en-US"/>
               <a:t>Assignmet 2</a:t>
             </a:r>
+            <a:endParaRPr lang="es-ES" altLang="en-US"/>
           </a:p>
         </p:txBody>
       </p:sp>
@@ -4071,12 +4076,14 @@
               <a:rPr lang="es-ES" altLang="en-US"/>
               <a:t>Propose Ontology</a:t>
             </a:r>
+            <a:endParaRPr lang="es-ES" altLang="en-US"/>
           </a:p>
           <a:p>
             <a:r>
               <a:rPr lang="es-ES" altLang="en-US"/>
               <a:t>Naming strategy:</a:t>
             </a:r>
+            <a:endParaRPr lang="es-ES" altLang="en-US"/>
           </a:p>
           <a:p>
             <a:pPr lvl="1"/>
@@ -4084,13 +4091,15 @@
               <a:rPr lang="es-ES" altLang="en-US"/>
               <a:t>http://handsOn.org/Group1</a:t>
             </a:r>
+            <a:endParaRPr lang="es-ES" altLang="en-US"/>
           </a:p>
           <a:p>
             <a:pPr lvl="1"/>
             <a:r>
               <a:rPr lang="es-ES" altLang="en-US"/>
-              <a:t>http://handsOn.org/GroupResource</a:t>
-            </a:r>
+              <a:t>http://handsOn.org/Group1#Resource</a:t>
+            </a:r>
+            <a:endParaRPr lang="es-ES" altLang="en-US"/>
           </a:p>
         </p:txBody>
       </p:sp>
@@ -4105,7 +4114,7 @@
           </p:nvPr>
         </p:nvPicPr>
         <p:blipFill>
-          <a:blip r:embed="rId2"/>
+          <a:blip r:embed="rId1"/>
           <a:stretch>
             <a:fillRect/>
           </a:stretch>
@@ -4129,7 +4138,7 @@
           <p:nvPr/>
         </p:nvPicPr>
         <p:blipFill>
-          <a:blip r:embed="rId3"/>
+          <a:blip r:embed="rId2"/>
           <a:stretch>
             <a:fillRect/>
           </a:stretch>
@@ -4153,7 +4162,7 @@
           <p:nvPr/>
         </p:nvPicPr>
         <p:blipFill>
-          <a:blip r:embed="rId4"/>
+          <a:blip r:embed="rId3"/>
           <a:stretch>
             <a:fillRect/>
           </a:stretch>
@@ -4212,6 +4221,7 @@
               <a:rPr lang="es-ES" altLang="en-US"/>
               <a:t>Assignment 3</a:t>
             </a:r>
+            <a:endParaRPr lang="es-ES" altLang="en-US"/>
           </a:p>
         </p:txBody>
       </p:sp>
@@ -4281,6 +4291,7 @@
               <a:rPr lang="es-ES" altLang="en-US" dirty="0" smtClean="0"/>
               <a:t> data</a:t>
             </a:r>
+            <a:endParaRPr lang="es-ES" altLang="en-US" dirty="0" smtClean="0"/>
           </a:p>
           <a:p>
             <a:r>
@@ -4355,7 +4366,7 @@
           <p:nvPr/>
         </p:nvPicPr>
         <p:blipFill>
-          <a:blip r:embed="rId2">
+          <a:blip r:embed="rId1">
             <a:extLst>
               <a:ext uri="{28A0092B-C50C-407E-A947-70E740481C1C}">
                 <a14:useLocalDpi xmlns:a14="http://schemas.microsoft.com/office/drawing/2010/main" val="0"/>
@@ -4436,6 +4447,7 @@
               <a:rPr lang="es-ES" altLang="en-US" dirty="0"/>
               <a:t> RDF</a:t>
             </a:r>
+            <a:endParaRPr lang="es-ES" altLang="en-US" dirty="0"/>
           </a:p>
           <a:p>
             <a:r>
@@ -4458,6 +4470,7 @@
               <a:rPr lang="es-ES" altLang="en-US" sz="1800" dirty="0" smtClean="0"/>
               <a:t>…</a:t>
             </a:r>
+            <a:endParaRPr lang="es-ES" altLang="en-US" sz="1800" dirty="0" smtClean="0"/>
           </a:p>
           <a:p>
             <a:r>
@@ -4516,6 +4529,7 @@
               <a:rPr lang="es-ES" altLang="en-US" dirty="0" smtClean="0"/>
               <a:t>JSON</a:t>
             </a:r>
+            <a:endParaRPr lang="es-ES" altLang="en-US" dirty="0" smtClean="0"/>
           </a:p>
           <a:p>
             <a:r>
@@ -4534,6 +4548,7 @@
               <a:rPr lang="es-ES" altLang="en-US" sz="1800" dirty="0" smtClean="0"/>
               <a:t>…</a:t>
             </a:r>
+            <a:endParaRPr lang="es-ES" altLang="en-US" sz="1800" dirty="0" smtClean="0"/>
           </a:p>
         </p:txBody>
       </p:sp>
@@ -4546,7 +4561,7 @@
           <p:nvPr/>
         </p:nvPicPr>
         <p:blipFill>
-          <a:blip r:embed="rId2">
+          <a:blip r:embed="rId1">
             <a:extLst>
               <a:ext uri="{28A0092B-C50C-407E-A947-70E740481C1C}">
                 <a14:useLocalDpi xmlns:a14="http://schemas.microsoft.com/office/drawing/2010/main" val="0"/>
@@ -4576,7 +4591,7 @@
           <p:nvPr/>
         </p:nvPicPr>
         <p:blipFill>
-          <a:blip r:embed="rId3">
+          <a:blip r:embed="rId2">
             <a:extLst>
               <a:ext uri="{28A0092B-C50C-407E-A947-70E740481C1C}">
                 <a14:useLocalDpi xmlns:a14="http://schemas.microsoft.com/office/drawing/2010/main" val="0"/>
@@ -4598,11 +4613,6 @@
         </p:spPr>
       </p:pic>
     </p:spTree>
-    <p:extLst>
-      <p:ext uri="{BB962C8B-B14F-4D97-AF65-F5344CB8AC3E}">
-        <p14:creationId xmlns:p14="http://schemas.microsoft.com/office/powerpoint/2010/main" val="3158434941"/>
-      </p:ext>
-    </p:extLst>
   </p:cSld>
   <p:clrMapOvr>
     <a:masterClrMapping/>
@@ -4646,6 +4656,7 @@
               <a:rPr lang="es-ES" altLang="en-US"/>
               <a:t>Assignment 4</a:t>
             </a:r>
+            <a:endParaRPr lang="es-ES" altLang="en-US"/>
           </a:p>
         </p:txBody>
       </p:sp>
@@ -4668,6 +4679,7 @@
               <a:rPr lang="es-ES" altLang="en-US"/>
               <a:t>Data linking</a:t>
             </a:r>
+            <a:endParaRPr lang="es-ES" altLang="en-US"/>
           </a:p>
         </p:txBody>
       </p:sp>
@@ -4715,6 +4727,7 @@
               <a:rPr lang="es-ES" altLang="en-US"/>
               <a:t>Assignment 5</a:t>
             </a:r>
+            <a:endParaRPr lang="es-ES" altLang="en-US"/>
           </a:p>
         </p:txBody>
       </p:sp>
@@ -4737,6 +4750,7 @@
               <a:rPr lang="es-ES" altLang="en-US"/>
               <a:t>Update with existing ontologies</a:t>
             </a:r>
+            <a:endParaRPr lang="es-ES" altLang="en-US"/>
           </a:p>
         </p:txBody>
       </p:sp>
@@ -4784,6 +4798,7 @@
               <a:rPr lang="es-ES" altLang="en-US"/>
               <a:t>Conclussions</a:t>
             </a:r>
+            <a:endParaRPr lang="es-ES" altLang="en-US"/>
           </a:p>
         </p:txBody>
       </p:sp>
@@ -4806,12 +4821,14 @@
               <a:rPr lang="es-ES" altLang="en-US"/>
               <a:t>Wide project</a:t>
             </a:r>
+            <a:endParaRPr lang="es-ES" altLang="en-US"/>
           </a:p>
           <a:p>
             <a:r>
               <a:rPr lang="es-ES" altLang="en-US"/>
               <a:t>Usefull real life applications</a:t>
             </a:r>
+            <a:endParaRPr lang="es-ES" altLang="en-US"/>
           </a:p>
           <a:p>
             <a:pPr marL="0" indent="0">
@@ -5020,7 +5037,6 @@
       </a:bgFillStyleLst>
     </a:fmtScheme>
   </a:themeElements>
-  <a:objectDefaults/>
   <a:extraClrSchemeLst>
     <a:extraClrScheme>
       <a:clrScheme name="">
@@ -5774,8 +5790,6 @@
       </a:bgFillStyleLst>
     </a:fmtScheme>
   </a:themeElements>
-  <a:objectDefaults/>
-  <a:extraClrSchemeLst/>
   <a:extLst>
     <a:ext uri="{05A4C25C-085E-4340-85A3-A5531E510DB2}">
       <thm15:themeFamily xmlns:thm15="http://schemas.microsoft.com/office/thememl/2012/main" name="Office Theme" id="{62F939B6-93AF-4DB8-9C6B-D6C7DFDC589F}" vid="{4A3C46E8-61CC-4603-A589-7422A47A8E4A}"/>

</xml_diff>